<commit_message>
Adding edits based on our discussion. > Co-authored-by: Abhijit Mitra amitracal@gmail.com> > Co-authored-by: Vaibhaw Kumar vaibhawkumar.uict@gmail.com
</commit_message>
<xml_diff>
--- a/content/ch-applications/images/qaoa_image.pptx
+++ b/content/ch-applications/images/qaoa_image.pptx
@@ -3495,10 +3495,10 @@
       </p:grpSpPr>
       <p:grpSp>
         <p:nvGrpSpPr>
-          <p:cNvPr id="18" name="Group 17">
-            <a:extLst>
-              <a:ext uri="{FF2B5EF4-FFF2-40B4-BE49-F238E27FC236}">
-                <a16:creationId xmlns:a16="http://schemas.microsoft.com/office/drawing/2014/main" id="{DFB479E0-D8A8-F446-8A56-A441FAFA140D}"/>
+          <p:cNvPr id="23" name="Group 22">
+            <a:extLst>
+              <a:ext uri="{FF2B5EF4-FFF2-40B4-BE49-F238E27FC236}">
+                <a16:creationId xmlns:a16="http://schemas.microsoft.com/office/drawing/2014/main" id="{9BB81F1E-C925-5244-9D42-600A72AD033E}"/>
               </a:ext>
             </a:extLst>
           </p:cNvPr>
@@ -3509,94 +3509,414 @@
           <a:xfrm>
             <a:off x="3278508" y="1249136"/>
             <a:ext cx="5530756" cy="4140976"/>
-            <a:chOff x="2168165" y="138793"/>
+            <a:chOff x="3278508" y="1249136"/>
             <a:chExt cx="5530756" cy="4140976"/>
           </a:xfrm>
         </p:grpSpPr>
-        <p:sp>
-          <p:nvSpPr>
-            <p:cNvPr id="4" name="Rectangle 3">
+        <p:grpSp>
+          <p:nvGrpSpPr>
+            <p:cNvPr id="18" name="Group 17">
               <a:extLst>
                 <a:ext uri="{FF2B5EF4-FFF2-40B4-BE49-F238E27FC236}">
-                  <a16:creationId xmlns:a16="http://schemas.microsoft.com/office/drawing/2014/main" id="{87231F65-FFEB-5D48-A538-1DA2E3BAE1B0}"/>
+                  <a16:creationId xmlns:a16="http://schemas.microsoft.com/office/drawing/2014/main" id="{DFB479E0-D8A8-F446-8A56-A441FAFA140D}"/>
                 </a:ext>
               </a:extLst>
             </p:cNvPr>
-            <p:cNvSpPr/>
+            <p:cNvGrpSpPr/>
             <p:nvPr/>
-          </p:nvSpPr>
-          <p:spPr>
+          </p:nvGrpSpPr>
+          <p:grpSpPr>
             <a:xfrm>
-              <a:off x="2168165" y="961534"/>
-              <a:ext cx="1828800" cy="3318235"/>
+              <a:off x="3278508" y="1249136"/>
+              <a:ext cx="5530756" cy="4140976"/>
+              <a:chOff x="2168165" y="138793"/>
+              <a:chExt cx="5530756" cy="4140976"/>
             </a:xfrm>
-            <a:prstGeom prst="rect">
-              <a:avLst/>
-            </a:prstGeom>
-            <a:solidFill>
-              <a:schemeClr val="accent1">
-                <a:lumMod val="20000"/>
-                <a:lumOff val="80000"/>
-              </a:schemeClr>
-            </a:solidFill>
-          </p:spPr>
-          <p:style>
-            <a:lnRef idx="2">
-              <a:schemeClr val="accent1">
-                <a:shade val="50000"/>
-              </a:schemeClr>
-            </a:lnRef>
-            <a:fillRef idx="1">
-              <a:schemeClr val="accent1"/>
-            </a:fillRef>
-            <a:effectRef idx="0">
-              <a:schemeClr val="accent1"/>
-            </a:effectRef>
-            <a:fontRef idx="minor">
-              <a:schemeClr val="lt1"/>
-            </a:fontRef>
-          </p:style>
-          <p:txBody>
-            <a:bodyPr rtlCol="0" anchor="ctr"/>
-            <a:lstStyle/>
-            <a:p>
-              <a:pPr algn="ctr"/>
-              <a:r>
-                <a:rPr lang="en-US" dirty="0">
-                  <a:solidFill>
-                    <a:schemeClr val="tx1"/>
-                  </a:solidFill>
-                </a:rPr>
-                <a:t>Prepare quantum state</a:t>
-              </a:r>
-            </a:p>
-          </p:txBody>
-        </p:sp>
+          </p:grpSpPr>
+          <p:sp>
+            <p:nvSpPr>
+              <p:cNvPr id="4" name="Rectangle 3">
+                <a:extLst>
+                  <a:ext uri="{FF2B5EF4-FFF2-40B4-BE49-F238E27FC236}">
+                    <a16:creationId xmlns:a16="http://schemas.microsoft.com/office/drawing/2014/main" id="{87231F65-FFEB-5D48-A538-1DA2E3BAE1B0}"/>
+                  </a:ext>
+                </a:extLst>
+              </p:cNvPr>
+              <p:cNvSpPr/>
+              <p:nvPr/>
+            </p:nvSpPr>
+            <p:spPr>
+              <a:xfrm>
+                <a:off x="2168165" y="961534"/>
+                <a:ext cx="1828800" cy="3318235"/>
+              </a:xfrm>
+              <a:prstGeom prst="rect">
+                <a:avLst/>
+              </a:prstGeom>
+              <a:solidFill>
+                <a:schemeClr val="accent1">
+                  <a:lumMod val="20000"/>
+                  <a:lumOff val="80000"/>
+                </a:schemeClr>
+              </a:solidFill>
+            </p:spPr>
+            <p:style>
+              <a:lnRef idx="2">
+                <a:schemeClr val="accent1">
+                  <a:shade val="50000"/>
+                </a:schemeClr>
+              </a:lnRef>
+              <a:fillRef idx="1">
+                <a:schemeClr val="accent1"/>
+              </a:fillRef>
+              <a:effectRef idx="0">
+                <a:schemeClr val="accent1"/>
+              </a:effectRef>
+              <a:fontRef idx="minor">
+                <a:schemeClr val="lt1"/>
+              </a:fontRef>
+            </p:style>
+            <p:txBody>
+              <a:bodyPr rtlCol="0" anchor="ctr"/>
+              <a:lstStyle/>
+              <a:p>
+                <a:pPr algn="ctr"/>
+                <a:r>
+                  <a:rPr lang="en-US" dirty="0">
+                    <a:solidFill>
+                      <a:schemeClr val="tx1"/>
+                    </a:solidFill>
+                  </a:rPr>
+                  <a:t>Prepare quantum state</a:t>
+                </a:r>
+              </a:p>
+            </p:txBody>
+          </p:sp>
+          <p:cxnSp>
+            <p:nvCxnSpPr>
+              <p:cNvPr id="8" name="Straight Arrow Connector 7">
+                <a:extLst>
+                  <a:ext uri="{FF2B5EF4-FFF2-40B4-BE49-F238E27FC236}">
+                    <a16:creationId xmlns:a16="http://schemas.microsoft.com/office/drawing/2014/main" id="{B9EAE808-2660-9D4C-ACDC-DE8AE076E9EF}"/>
+                  </a:ext>
+                </a:extLst>
+              </p:cNvPr>
+              <p:cNvCxnSpPr>
+                <a:stCxn id="4" idx="3"/>
+              </p:cNvCxnSpPr>
+              <p:nvPr/>
+            </p:nvCxnSpPr>
+            <p:spPr>
+              <a:xfrm flipV="1">
+                <a:off x="3996964" y="2620650"/>
+                <a:ext cx="1371600" cy="0"/>
+              </a:xfrm>
+              <a:prstGeom prst="straightConnector1">
+                <a:avLst/>
+              </a:prstGeom>
+              <a:ln w="38100">
+                <a:tailEnd type="triangle"/>
+              </a:ln>
+            </p:spPr>
+            <p:style>
+              <a:lnRef idx="1">
+                <a:schemeClr val="accent1"/>
+              </a:lnRef>
+              <a:fillRef idx="0">
+                <a:schemeClr val="accent1"/>
+              </a:fillRef>
+              <a:effectRef idx="0">
+                <a:schemeClr val="accent1"/>
+              </a:effectRef>
+              <a:fontRef idx="minor">
+                <a:schemeClr val="tx1"/>
+              </a:fontRef>
+            </p:style>
+          </p:cxnSp>
+          <p:sp>
+            <p:nvSpPr>
+              <p:cNvPr id="9" name="Rectangle 8">
+                <a:extLst>
+                  <a:ext uri="{FF2B5EF4-FFF2-40B4-BE49-F238E27FC236}">
+                    <a16:creationId xmlns:a16="http://schemas.microsoft.com/office/drawing/2014/main" id="{0E82EC3E-AFEF-7641-B403-65670C39B4F6}"/>
+                  </a:ext>
+                </a:extLst>
+              </p:cNvPr>
+              <p:cNvSpPr/>
+              <p:nvPr/>
+            </p:nvSpPr>
+            <p:spPr>
+              <a:xfrm>
+                <a:off x="5368564" y="1736465"/>
+                <a:ext cx="2330357" cy="1768369"/>
+              </a:xfrm>
+              <a:prstGeom prst="rect">
+                <a:avLst/>
+              </a:prstGeom>
+              <a:solidFill>
+                <a:schemeClr val="accent6">
+                  <a:lumMod val="20000"/>
+                  <a:lumOff val="80000"/>
+                </a:schemeClr>
+              </a:solidFill>
+              <a:ln>
+                <a:solidFill>
+                  <a:schemeClr val="accent6"/>
+                </a:solidFill>
+              </a:ln>
+            </p:spPr>
+            <p:style>
+              <a:lnRef idx="2">
+                <a:schemeClr val="accent1">
+                  <a:shade val="50000"/>
+                </a:schemeClr>
+              </a:lnRef>
+              <a:fillRef idx="1">
+                <a:schemeClr val="accent1"/>
+              </a:fillRef>
+              <a:effectRef idx="0">
+                <a:schemeClr val="accent1"/>
+              </a:effectRef>
+              <a:fontRef idx="minor">
+                <a:schemeClr val="lt1"/>
+              </a:fontRef>
+            </p:style>
+            <p:txBody>
+              <a:bodyPr rtlCol="0" anchor="ctr"/>
+              <a:lstStyle/>
+              <a:p>
+                <a:pPr algn="ctr"/>
+                <a:r>
+                  <a:rPr lang="en-US" dirty="0">
+                    <a:solidFill>
+                      <a:schemeClr val="tx1"/>
+                    </a:solidFill>
+                  </a:rPr>
+                  <a:t>Compute expectation</a:t>
+                </a:r>
+              </a:p>
+            </p:txBody>
+          </p:sp>
+          <p:pic>
+            <p:nvPicPr>
+              <p:cNvPr id="10" name="Picture 9">
+                <a:extLst>
+                  <a:ext uri="{FF2B5EF4-FFF2-40B4-BE49-F238E27FC236}">
+                    <a16:creationId xmlns:a16="http://schemas.microsoft.com/office/drawing/2014/main" id="{91D37259-7376-BA4C-B3CD-4E06C4282605}"/>
+                  </a:ext>
+                </a:extLst>
+              </p:cNvPr>
+              <p:cNvPicPr>
+                <a:picLocks noChangeAspect="1"/>
+              </p:cNvPicPr>
+              <p:nvPr/>
+            </p:nvPicPr>
+            <p:blipFill>
+              <a:blip r:embed="rId2"/>
+              <a:stretch>
+                <a:fillRect/>
+              </a:stretch>
+            </p:blipFill>
+            <p:spPr>
+              <a:xfrm>
+                <a:off x="5656898" y="2771094"/>
+                <a:ext cx="1737360" cy="208706"/>
+              </a:xfrm>
+              <a:prstGeom prst="rect">
+                <a:avLst/>
+              </a:prstGeom>
+            </p:spPr>
+          </p:pic>
+          <p:sp>
+            <p:nvSpPr>
+              <p:cNvPr id="11" name="Rectangle 10">
+                <a:extLst>
+                  <a:ext uri="{FF2B5EF4-FFF2-40B4-BE49-F238E27FC236}">
+                    <a16:creationId xmlns:a16="http://schemas.microsoft.com/office/drawing/2014/main" id="{EB3CF03B-043E-664D-AF7E-30FD7546F334}"/>
+                  </a:ext>
+                </a:extLst>
+              </p:cNvPr>
+              <p:cNvSpPr/>
+              <p:nvPr/>
+            </p:nvSpPr>
+            <p:spPr>
+              <a:xfrm>
+                <a:off x="5368565" y="138793"/>
+                <a:ext cx="2330356" cy="1208314"/>
+              </a:xfrm>
+              <a:prstGeom prst="rect">
+                <a:avLst/>
+              </a:prstGeom>
+              <a:solidFill>
+                <a:schemeClr val="accent2">
+                  <a:lumMod val="20000"/>
+                  <a:lumOff val="80000"/>
+                </a:schemeClr>
+              </a:solidFill>
+              <a:ln>
+                <a:solidFill>
+                  <a:schemeClr val="accent2">
+                    <a:lumMod val="75000"/>
+                  </a:schemeClr>
+                </a:solidFill>
+              </a:ln>
+            </p:spPr>
+            <p:style>
+              <a:lnRef idx="2">
+                <a:schemeClr val="accent1">
+                  <a:shade val="50000"/>
+                </a:schemeClr>
+              </a:lnRef>
+              <a:fillRef idx="1">
+                <a:schemeClr val="accent1"/>
+              </a:fillRef>
+              <a:effectRef idx="0">
+                <a:schemeClr val="accent1"/>
+              </a:effectRef>
+              <a:fontRef idx="minor">
+                <a:schemeClr val="lt1"/>
+              </a:fontRef>
+            </p:style>
+            <p:txBody>
+              <a:bodyPr rtlCol="0" anchor="ctr"/>
+              <a:lstStyle/>
+              <a:p>
+                <a:pPr algn="ctr"/>
+                <a:r>
+                  <a:rPr lang="en-US" dirty="0">
+                    <a:solidFill>
+                      <a:schemeClr val="tx1"/>
+                    </a:solidFill>
+                  </a:rPr>
+                  <a:t>Classical optimizer </a:t>
+                </a:r>
+              </a:p>
+            </p:txBody>
+          </p:sp>
+          <p:pic>
+            <p:nvPicPr>
+              <p:cNvPr id="12" name="Picture 11">
+                <a:extLst>
+                  <a:ext uri="{FF2B5EF4-FFF2-40B4-BE49-F238E27FC236}">
+                    <a16:creationId xmlns:a16="http://schemas.microsoft.com/office/drawing/2014/main" id="{913CFD53-174D-3845-A1D8-F6A7F3F36960}"/>
+                  </a:ext>
+                </a:extLst>
+              </p:cNvPr>
+              <p:cNvPicPr>
+                <a:picLocks noChangeAspect="1"/>
+              </p:cNvPicPr>
+              <p:nvPr/>
+            </p:nvPicPr>
+            <p:blipFill>
+              <a:blip r:embed="rId3"/>
+              <a:stretch>
+                <a:fillRect/>
+              </a:stretch>
+            </p:blipFill>
+            <p:spPr>
+              <a:xfrm>
+                <a:off x="5802222" y="971514"/>
+                <a:ext cx="1280160" cy="242904"/>
+              </a:xfrm>
+              <a:prstGeom prst="rect">
+                <a:avLst/>
+              </a:prstGeom>
+            </p:spPr>
+          </p:pic>
+          <p:cxnSp>
+            <p:nvCxnSpPr>
+              <p:cNvPr id="16" name="Straight Arrow Connector 15">
+                <a:extLst>
+                  <a:ext uri="{FF2B5EF4-FFF2-40B4-BE49-F238E27FC236}">
+                    <a16:creationId xmlns:a16="http://schemas.microsoft.com/office/drawing/2014/main" id="{7534B927-F6C5-3845-AB71-FBC04C2C4422}"/>
+                  </a:ext>
+                </a:extLst>
+              </p:cNvPr>
+              <p:cNvCxnSpPr/>
+              <p:nvPr/>
+            </p:nvCxnSpPr>
+            <p:spPr>
+              <a:xfrm>
+                <a:off x="3105375" y="742949"/>
+                <a:ext cx="0" cy="218583"/>
+              </a:xfrm>
+              <a:prstGeom prst="straightConnector1">
+                <a:avLst/>
+              </a:prstGeom>
+              <a:ln w="38100">
+                <a:tailEnd type="triangle"/>
+              </a:ln>
+            </p:spPr>
+            <p:style>
+              <a:lnRef idx="1">
+                <a:schemeClr val="accent1"/>
+              </a:lnRef>
+              <a:fillRef idx="0">
+                <a:schemeClr val="accent1"/>
+              </a:fillRef>
+              <a:effectRef idx="0">
+                <a:schemeClr val="accent1"/>
+              </a:effectRef>
+              <a:fontRef idx="minor">
+                <a:schemeClr val="tx1"/>
+              </a:fontRef>
+            </p:style>
+          </p:cxnSp>
+          <p:pic>
+            <p:nvPicPr>
+              <p:cNvPr id="17" name="Picture 16">
+                <a:extLst>
+                  <a:ext uri="{FF2B5EF4-FFF2-40B4-BE49-F238E27FC236}">
+                    <a16:creationId xmlns:a16="http://schemas.microsoft.com/office/drawing/2014/main" id="{5BE3AB72-533C-4E49-874A-C730968EEE4B}"/>
+                  </a:ext>
+                </a:extLst>
+              </p:cNvPr>
+              <p:cNvPicPr>
+                <a:picLocks noChangeAspect="1"/>
+              </p:cNvPicPr>
+              <p:nvPr/>
+            </p:nvPicPr>
+            <p:blipFill>
+              <a:blip r:embed="rId4"/>
+              <a:stretch>
+                <a:fillRect/>
+              </a:stretch>
+            </p:blipFill>
+            <p:spPr>
+              <a:xfrm>
+                <a:off x="2503377" y="3016022"/>
+                <a:ext cx="1005840" cy="277734"/>
+              </a:xfrm>
+              <a:prstGeom prst="rect">
+                <a:avLst/>
+              </a:prstGeom>
+            </p:spPr>
+          </p:pic>
+        </p:grpSp>
         <p:cxnSp>
           <p:nvCxnSpPr>
-            <p:cNvPr id="8" name="Straight Arrow Connector 7">
+            <p:cNvPr id="20" name="Straight Connector 19">
               <a:extLst>
                 <a:ext uri="{FF2B5EF4-FFF2-40B4-BE49-F238E27FC236}">
-                  <a16:creationId xmlns:a16="http://schemas.microsoft.com/office/drawing/2014/main" id="{B9EAE808-2660-9D4C-ACDC-DE8AE076E9EF}"/>
+                  <a16:creationId xmlns:a16="http://schemas.microsoft.com/office/drawing/2014/main" id="{F08E1215-0C2C-9F4A-8F64-559A0A008361}"/>
                 </a:ext>
               </a:extLst>
             </p:cNvPr>
             <p:cNvCxnSpPr>
-              <a:stCxn id="4" idx="3"/>
+              <a:cxnSpLocks/>
+              <a:stCxn id="11" idx="1"/>
             </p:cNvCxnSpPr>
             <p:nvPr/>
           </p:nvCxnSpPr>
           <p:spPr>
-            <a:xfrm flipV="1">
-              <a:off x="3996964" y="2620650"/>
-              <a:ext cx="1371600" cy="0"/>
+            <a:xfrm flipH="1">
+              <a:off x="4192908" y="1853293"/>
+              <a:ext cx="2286000" cy="0"/>
             </a:xfrm>
-            <a:prstGeom prst="straightConnector1">
+            <a:prstGeom prst="line">
               <a:avLst/>
             </a:prstGeom>
-            <a:ln w="38100">
-              <a:tailEnd type="triangle"/>
-            </a:ln>
+            <a:ln w="38100"/>
           </p:spPr>
           <p:style>
             <a:lnRef idx="1">
@@ -3613,283 +3933,33 @@
             </a:fontRef>
           </p:style>
         </p:cxnSp>
-        <p:sp>
-          <p:nvSpPr>
-            <p:cNvPr id="9" name="Rectangle 8">
-              <a:extLst>
-                <a:ext uri="{FF2B5EF4-FFF2-40B4-BE49-F238E27FC236}">
-                  <a16:creationId xmlns:a16="http://schemas.microsoft.com/office/drawing/2014/main" id="{0E82EC3E-AFEF-7641-B403-65670C39B4F6}"/>
-                </a:ext>
-              </a:extLst>
-            </p:cNvPr>
-            <p:cNvSpPr/>
-            <p:nvPr/>
-          </p:nvSpPr>
-          <p:spPr>
-            <a:xfrm>
-              <a:off x="5368564" y="1736465"/>
-              <a:ext cx="2330357" cy="1768369"/>
-            </a:xfrm>
-            <a:prstGeom prst="rect">
-              <a:avLst/>
-            </a:prstGeom>
-            <a:solidFill>
-              <a:schemeClr val="accent6">
-                <a:lumMod val="20000"/>
-                <a:lumOff val="80000"/>
-              </a:schemeClr>
-            </a:solidFill>
-            <a:ln>
-              <a:solidFill>
-                <a:schemeClr val="accent6"/>
-              </a:solidFill>
-            </a:ln>
-          </p:spPr>
-          <p:style>
-            <a:lnRef idx="2">
-              <a:schemeClr val="accent1">
-                <a:shade val="50000"/>
-              </a:schemeClr>
-            </a:lnRef>
-            <a:fillRef idx="1">
-              <a:schemeClr val="accent1"/>
-            </a:fillRef>
-            <a:effectRef idx="0">
-              <a:schemeClr val="accent1"/>
-            </a:effectRef>
-            <a:fontRef idx="minor">
-              <a:schemeClr val="lt1"/>
-            </a:fontRef>
-          </p:style>
-          <p:txBody>
-            <a:bodyPr rtlCol="0" anchor="ctr"/>
-            <a:lstStyle/>
-            <a:p>
-              <a:pPr algn="ctr"/>
-              <a:r>
-                <a:rPr lang="en-US" dirty="0">
-                  <a:solidFill>
-                    <a:schemeClr val="tx1"/>
-                  </a:solidFill>
-                </a:rPr>
-                <a:t>Compute expectation</a:t>
-              </a:r>
-            </a:p>
-          </p:txBody>
-        </p:sp>
-        <p:pic>
-          <p:nvPicPr>
-            <p:cNvPr id="10" name="Picture 9">
-              <a:extLst>
-                <a:ext uri="{FF2B5EF4-FFF2-40B4-BE49-F238E27FC236}">
-                  <a16:creationId xmlns:a16="http://schemas.microsoft.com/office/drawing/2014/main" id="{91D37259-7376-BA4C-B3CD-4E06C4282605}"/>
-                </a:ext>
-              </a:extLst>
-            </p:cNvPr>
-            <p:cNvPicPr>
-              <a:picLocks noChangeAspect="1"/>
-            </p:cNvPicPr>
-            <p:nvPr/>
-          </p:nvPicPr>
-          <p:blipFill>
-            <a:blip r:embed="rId2"/>
-            <a:stretch>
-              <a:fillRect/>
-            </a:stretch>
-          </p:blipFill>
-          <p:spPr>
-            <a:xfrm>
-              <a:off x="5656898" y="2771094"/>
-              <a:ext cx="1737360" cy="208706"/>
-            </a:xfrm>
-            <a:prstGeom prst="rect">
-              <a:avLst/>
-            </a:prstGeom>
-          </p:spPr>
-        </p:pic>
-        <p:sp>
-          <p:nvSpPr>
-            <p:cNvPr id="11" name="Rectangle 10">
-              <a:extLst>
-                <a:ext uri="{FF2B5EF4-FFF2-40B4-BE49-F238E27FC236}">
-                  <a16:creationId xmlns:a16="http://schemas.microsoft.com/office/drawing/2014/main" id="{EB3CF03B-043E-664D-AF7E-30FD7546F334}"/>
-                </a:ext>
-              </a:extLst>
-            </p:cNvPr>
-            <p:cNvSpPr/>
-            <p:nvPr/>
-          </p:nvSpPr>
-          <p:spPr>
-            <a:xfrm>
-              <a:off x="5368565" y="138793"/>
-              <a:ext cx="2330356" cy="1208314"/>
-            </a:xfrm>
-            <a:prstGeom prst="rect">
-              <a:avLst/>
-            </a:prstGeom>
-            <a:solidFill>
-              <a:schemeClr val="accent2">
-                <a:lumMod val="20000"/>
-                <a:lumOff val="80000"/>
-              </a:schemeClr>
-            </a:solidFill>
-          </p:spPr>
-          <p:style>
-            <a:lnRef idx="2">
-              <a:schemeClr val="accent1">
-                <a:shade val="50000"/>
-              </a:schemeClr>
-            </a:lnRef>
-            <a:fillRef idx="1">
-              <a:schemeClr val="accent1"/>
-            </a:fillRef>
-            <a:effectRef idx="0">
-              <a:schemeClr val="accent1"/>
-            </a:effectRef>
-            <a:fontRef idx="minor">
-              <a:schemeClr val="lt1"/>
-            </a:fontRef>
-          </p:style>
-          <p:txBody>
-            <a:bodyPr rtlCol="0" anchor="ctr"/>
-            <a:lstStyle/>
-            <a:p>
-              <a:pPr algn="ctr"/>
-              <a:r>
-                <a:rPr lang="en-US" dirty="0">
-                  <a:solidFill>
-                    <a:schemeClr val="tx1"/>
-                  </a:solidFill>
-                </a:rPr>
-                <a:t>Classical optimizer </a:t>
-              </a:r>
-            </a:p>
-          </p:txBody>
-        </p:sp>
-        <p:pic>
-          <p:nvPicPr>
-            <p:cNvPr id="12" name="Picture 11">
-              <a:extLst>
-                <a:ext uri="{FF2B5EF4-FFF2-40B4-BE49-F238E27FC236}">
-                  <a16:creationId xmlns:a16="http://schemas.microsoft.com/office/drawing/2014/main" id="{913CFD53-174D-3845-A1D8-F6A7F3F36960}"/>
-                </a:ext>
-              </a:extLst>
-            </p:cNvPr>
-            <p:cNvPicPr>
-              <a:picLocks noChangeAspect="1"/>
-            </p:cNvPicPr>
-            <p:nvPr/>
-          </p:nvPicPr>
-          <p:blipFill>
-            <a:blip r:embed="rId3"/>
-            <a:stretch>
-              <a:fillRect/>
-            </a:stretch>
-          </p:blipFill>
-          <p:spPr>
-            <a:xfrm>
-              <a:off x="5802222" y="971514"/>
-              <a:ext cx="1280160" cy="242904"/>
-            </a:xfrm>
-            <a:prstGeom prst="rect">
-              <a:avLst/>
-            </a:prstGeom>
-          </p:spPr>
-        </p:pic>
-        <p:cxnSp>
-          <p:nvCxnSpPr>
-            <p:cNvPr id="16" name="Straight Arrow Connector 15">
-              <a:extLst>
-                <a:ext uri="{FF2B5EF4-FFF2-40B4-BE49-F238E27FC236}">
-                  <a16:creationId xmlns:a16="http://schemas.microsoft.com/office/drawing/2014/main" id="{7534B927-F6C5-3845-AB71-FBC04C2C4422}"/>
-                </a:ext>
-              </a:extLst>
-            </p:cNvPr>
-            <p:cNvCxnSpPr/>
-            <p:nvPr/>
-          </p:nvCxnSpPr>
-          <p:spPr>
-            <a:xfrm>
-              <a:off x="3105375" y="742949"/>
-              <a:ext cx="0" cy="218583"/>
-            </a:xfrm>
-            <a:prstGeom prst="straightConnector1">
-              <a:avLst/>
-            </a:prstGeom>
-            <a:ln w="38100">
-              <a:tailEnd type="triangle"/>
-            </a:ln>
-          </p:spPr>
-          <p:style>
-            <a:lnRef idx="1">
-              <a:schemeClr val="accent1"/>
-            </a:lnRef>
-            <a:fillRef idx="0">
-              <a:schemeClr val="accent1"/>
-            </a:fillRef>
-            <a:effectRef idx="0">
-              <a:schemeClr val="accent1"/>
-            </a:effectRef>
-            <a:fontRef idx="minor">
-              <a:schemeClr val="tx1"/>
-            </a:fontRef>
-          </p:style>
-        </p:cxnSp>
-        <p:pic>
-          <p:nvPicPr>
-            <p:cNvPr id="17" name="Picture 16">
-              <a:extLst>
-                <a:ext uri="{FF2B5EF4-FFF2-40B4-BE49-F238E27FC236}">
-                  <a16:creationId xmlns:a16="http://schemas.microsoft.com/office/drawing/2014/main" id="{5BE3AB72-533C-4E49-874A-C730968EEE4B}"/>
-                </a:ext>
-              </a:extLst>
-            </p:cNvPr>
-            <p:cNvPicPr>
-              <a:picLocks noChangeAspect="1"/>
-            </p:cNvPicPr>
-            <p:nvPr/>
-          </p:nvPicPr>
-          <p:blipFill>
-            <a:blip r:embed="rId4"/>
-            <a:stretch>
-              <a:fillRect/>
-            </a:stretch>
-          </p:blipFill>
-          <p:spPr>
-            <a:xfrm>
-              <a:off x="2503377" y="3016022"/>
-              <a:ext cx="1005840" cy="277734"/>
-            </a:xfrm>
-            <a:prstGeom prst="rect">
-              <a:avLst/>
-            </a:prstGeom>
-          </p:spPr>
-        </p:pic>
       </p:grpSp>
       <p:cxnSp>
         <p:nvCxnSpPr>
-          <p:cNvPr id="20" name="Straight Connector 19">
-            <a:extLst>
-              <a:ext uri="{FF2B5EF4-FFF2-40B4-BE49-F238E27FC236}">
-                <a16:creationId xmlns:a16="http://schemas.microsoft.com/office/drawing/2014/main" id="{F08E1215-0C2C-9F4A-8F64-559A0A008361}"/>
+          <p:cNvPr id="25" name="Straight Arrow Connector 24">
+            <a:extLst>
+              <a:ext uri="{FF2B5EF4-FFF2-40B4-BE49-F238E27FC236}">
+                <a16:creationId xmlns:a16="http://schemas.microsoft.com/office/drawing/2014/main" id="{5B9F81EB-F90D-764F-9FAA-B5F6A0421AD0}"/>
               </a:ext>
             </a:extLst>
           </p:cNvPr>
           <p:cNvCxnSpPr>
-            <a:cxnSpLocks/>
-            <a:stCxn id="11" idx="1"/>
+            <a:stCxn id="9" idx="0"/>
+            <a:endCxn id="11" idx="2"/>
           </p:cNvCxnSpPr>
           <p:nvPr/>
         </p:nvCxnSpPr>
         <p:spPr>
-          <a:xfrm flipH="1">
-            <a:off x="4192908" y="1853293"/>
-            <a:ext cx="2286000" cy="0"/>
+          <a:xfrm flipV="1">
+            <a:off x="7644086" y="2457450"/>
+            <a:ext cx="0" cy="389358"/>
           </a:xfrm>
-          <a:prstGeom prst="line">
+          <a:prstGeom prst="straightConnector1">
             <a:avLst/>
           </a:prstGeom>
-          <a:ln w="38100"/>
+          <a:ln w="38100">
+            <a:tailEnd type="triangle"/>
+          </a:ln>
         </p:spPr>
         <p:style>
           <a:lnRef idx="1">

</xml_diff>